<commit_message>
updated proposal and presentation
</commit_message>
<xml_diff>
--- a/presentations/cert-mbeddr.pptx
+++ b/presentations/cert-mbeddr.pptx
@@ -4333,7 +4333,7 @@
             </a:r>
             <a:r>
               <a:rPr lang="en-US" sz="2400" dirty="0" smtClean="0"/>
-              <a:t>: Traceability reports (requirement down to C code)</a:t>
+              <a:t>: Traceability reports (requirements down to C code)</a:t>
             </a:r>
           </a:p>
           <a:p>
@@ -4358,7 +4358,7 @@
             </a:r>
             <a:r>
               <a:rPr lang="en-US" sz="3000" dirty="0" smtClean="0"/>
-              <a:t>: Integrate all these technical arguments into a logical certification (qualification?) argument of the C code generated by </a:t>
+              <a:t>: Integrate all these technical arguments into a logical certification (qualification??) argument of the C code generated by </a:t>
             </a:r>
             <a:r>
               <a:rPr lang="en-US" sz="3000" i="1" dirty="0" err="1" smtClean="0"/>
@@ -4482,7 +4482,7 @@
             </a:r>
             <a:r>
               <a:rPr lang="en-US" sz="2000" dirty="0" smtClean="0"/>
-              <a:t> (with financing?)</a:t>
+              <a:t> (with financing??)</a:t>
             </a:r>
           </a:p>
           <a:p>
@@ -4508,12 +4508,16 @@
               <a:t>he </a:t>
             </a:r>
             <a:r>
-              <a:rPr lang="en-US" sz="2000" dirty="0" err="1" smtClean="0"/>
+              <a:rPr lang="en-US" sz="2000" i="1" dirty="0" err="1" smtClean="0"/>
               <a:t>mbeddr</a:t>
             </a:r>
             <a:r>
+              <a:rPr lang="en-US" sz="2000" i="1" dirty="0" smtClean="0"/>
+              <a:t> </a:t>
+            </a:r>
+            <a:r>
               <a:rPr lang="en-US" sz="2000" dirty="0" smtClean="0"/>
-              <a:t> team</a:t>
+              <a:t>team</a:t>
             </a:r>
             <a:endParaRPr lang="en-US" sz="2400" dirty="0" smtClean="0"/>
           </a:p>
@@ -4684,27 +4688,22 @@
             </a:endParaRPr>
           </a:p>
           <a:p>
-            <a:pPr marL="342900" marR="0" lvl="0" indent="-342900" algn="l" defTabSz="457200" rtl="0" eaLnBrk="1" fontAlgn="auto" latinLnBrk="0" hangingPunct="1">
-              <a:lnSpc>
-                <a:spcPct val="100000"/>
-              </a:lnSpc>
+            <a:pPr marL="342900" lvl="0" indent="-342900">
               <a:spcBef>
                 <a:spcPct val="20000"/>
               </a:spcBef>
-              <a:spcAft>
-                <a:spcPts val="0"/>
-              </a:spcAft>
-              <a:buClrTx/>
-              <a:buSzTx/>
               <a:buFont typeface="Arial"/>
               <a:buChar char="•"/>
-              <a:tabLst/>
-              <a:defRPr/>
             </a:pPr>
             <a:r>
               <a:rPr lang="en-US" sz="2000" dirty="0" smtClean="0"/>
-              <a:t>OHB? (Aerospace)</a:t>
-            </a:r>
+              <a:t>OHB (Aerospace) </a:t>
+            </a:r>
+            <a:r>
+              <a:rPr lang="en-US" sz="2000" dirty="0" smtClean="0"/>
+              <a:t>(with financing??)</a:t>
+            </a:r>
+            <a:endParaRPr lang="en-US" sz="2000" dirty="0" smtClean="0"/>
           </a:p>
           <a:p>
             <a:pPr marL="342900" marR="0" lvl="0" indent="-342900" algn="l" defTabSz="457200" rtl="0" eaLnBrk="1" fontAlgn="auto" latinLnBrk="0" hangingPunct="1">

</xml_diff>

<commit_message>
added project management info
</commit_message>
<xml_diff>
--- a/presentations/cert-mbeddr.pptx
+++ b/presentations/cert-mbeddr.pptx
@@ -10,6 +10,8 @@
     <p:sldId id="257" r:id="rId4"/>
     <p:sldId id="259" r:id="rId5"/>
     <p:sldId id="260" r:id="rId6"/>
+    <p:sldId id="261" r:id="rId7"/>
+    <p:sldId id="262" r:id="rId8"/>
   </p:sldIdLst>
   <p:sldSz cx="9144000" cy="6858000" type="screen4x3"/>
   <p:notesSz cx="6858000" cy="9144000"/>
@@ -293,7 +295,7 @@
             <a:fld id="{FC42F63F-51B3-7C45-839B-1232DC311CC3}" type="datetimeFigureOut">
               <a:rPr lang="en-US" smtClean="0"/>
               <a:pPr/>
-              <a:t>12/16/15</a:t>
+              <a:t>2/2/16</a:t>
             </a:fld>
             <a:endParaRPr lang="en-US"/>
           </a:p>
@@ -460,7 +462,7 @@
             <a:fld id="{FC42F63F-51B3-7C45-839B-1232DC311CC3}" type="datetimeFigureOut">
               <a:rPr lang="en-US" smtClean="0"/>
               <a:pPr/>
-              <a:t>12/16/15</a:t>
+              <a:t>2/2/16</a:t>
             </a:fld>
             <a:endParaRPr lang="en-US"/>
           </a:p>
@@ -637,7 +639,7 @@
             <a:fld id="{FC42F63F-51B3-7C45-839B-1232DC311CC3}" type="datetimeFigureOut">
               <a:rPr lang="en-US" smtClean="0"/>
               <a:pPr/>
-              <a:t>12/16/15</a:t>
+              <a:t>2/2/16</a:t>
             </a:fld>
             <a:endParaRPr lang="en-US"/>
           </a:p>
@@ -804,7 +806,7 @@
             <a:fld id="{FC42F63F-51B3-7C45-839B-1232DC311CC3}" type="datetimeFigureOut">
               <a:rPr lang="en-US" smtClean="0"/>
               <a:pPr/>
-              <a:t>12/16/15</a:t>
+              <a:t>2/2/16</a:t>
             </a:fld>
             <a:endParaRPr lang="en-US"/>
           </a:p>
@@ -1047,7 +1049,7 @@
             <a:fld id="{FC42F63F-51B3-7C45-839B-1232DC311CC3}" type="datetimeFigureOut">
               <a:rPr lang="en-US" smtClean="0"/>
               <a:pPr/>
-              <a:t>12/16/15</a:t>
+              <a:t>2/2/16</a:t>
             </a:fld>
             <a:endParaRPr lang="en-US"/>
           </a:p>
@@ -1332,7 +1334,7 @@
             <a:fld id="{FC42F63F-51B3-7C45-839B-1232DC311CC3}" type="datetimeFigureOut">
               <a:rPr lang="en-US" smtClean="0"/>
               <a:pPr/>
-              <a:t>12/16/15</a:t>
+              <a:t>2/2/16</a:t>
             </a:fld>
             <a:endParaRPr lang="en-US"/>
           </a:p>
@@ -1751,7 +1753,7 @@
             <a:fld id="{FC42F63F-51B3-7C45-839B-1232DC311CC3}" type="datetimeFigureOut">
               <a:rPr lang="en-US" smtClean="0"/>
               <a:pPr/>
-              <a:t>12/16/15</a:t>
+              <a:t>2/2/16</a:t>
             </a:fld>
             <a:endParaRPr lang="en-US"/>
           </a:p>
@@ -1866,7 +1868,7 @@
             <a:fld id="{FC42F63F-51B3-7C45-839B-1232DC311CC3}" type="datetimeFigureOut">
               <a:rPr lang="en-US" smtClean="0"/>
               <a:pPr/>
-              <a:t>12/16/15</a:t>
+              <a:t>2/2/16</a:t>
             </a:fld>
             <a:endParaRPr lang="en-US"/>
           </a:p>
@@ -1958,7 +1960,7 @@
             <a:fld id="{FC42F63F-51B3-7C45-839B-1232DC311CC3}" type="datetimeFigureOut">
               <a:rPr lang="en-US" smtClean="0"/>
               <a:pPr/>
-              <a:t>12/16/15</a:t>
+              <a:t>2/2/16</a:t>
             </a:fld>
             <a:endParaRPr lang="en-US"/>
           </a:p>
@@ -2232,7 +2234,7 @@
             <a:fld id="{FC42F63F-51B3-7C45-839B-1232DC311CC3}" type="datetimeFigureOut">
               <a:rPr lang="en-US" smtClean="0"/>
               <a:pPr/>
-              <a:t>12/16/15</a:t>
+              <a:t>2/2/16</a:t>
             </a:fld>
             <a:endParaRPr lang="en-US"/>
           </a:p>
@@ -2482,7 +2484,7 @@
             <a:fld id="{FC42F63F-51B3-7C45-839B-1232DC311CC3}" type="datetimeFigureOut">
               <a:rPr lang="en-US" smtClean="0"/>
               <a:pPr/>
-              <a:t>12/16/15</a:t>
+              <a:t>2/2/16</a:t>
             </a:fld>
             <a:endParaRPr lang="en-US"/>
           </a:p>
@@ -2692,7 +2694,7 @@
             <a:fld id="{FC42F63F-51B3-7C45-839B-1232DC311CC3}" type="datetimeFigureOut">
               <a:rPr lang="en-US" smtClean="0"/>
               <a:pPr/>
-              <a:t>12/16/15</a:t>
+              <a:t>2/2/16</a:t>
             </a:fld>
             <a:endParaRPr lang="en-US"/>
           </a:p>
@@ -3102,7 +3104,9 @@
         </p:nvSpPr>
         <p:spPr/>
         <p:txBody>
-          <a:bodyPr/>
+          <a:bodyPr>
+            <a:normAutofit fontScale="92500" lnSpcReduction="20000"/>
+          </a:bodyPr>
           <a:lstStyle/>
           <a:p>
             <a:r>
@@ -3113,9 +3117,74 @@
           <a:p>
             <a:r>
               <a:rPr lang="en-US" dirty="0" smtClean="0"/>
-              <a:t>Embedded Software in C</a:t>
-            </a:r>
-            <a:endParaRPr lang="en-US" dirty="0"/>
+              <a:t>Embedded Software in </a:t>
+            </a:r>
+            <a:r>
+              <a:rPr lang="en-US" dirty="0" smtClean="0"/>
+              <a:t>C</a:t>
+            </a:r>
+          </a:p>
+          <a:p>
+            <a:endParaRPr lang="en-US" dirty="0" smtClean="0"/>
+          </a:p>
+          <a:p>
+            <a:r>
+              <a:rPr lang="en-US" sz="2353" dirty="0" smtClean="0">
+                <a:solidFill>
+                  <a:schemeClr val="bg1">
+                    <a:lumMod val="50000"/>
+                  </a:schemeClr>
+                </a:solidFill>
+              </a:rPr>
+              <a:t>Levi </a:t>
+            </a:r>
+            <a:r>
+              <a:rPr lang="en-US" sz="2353" dirty="0" err="1" smtClean="0">
+                <a:solidFill>
+                  <a:schemeClr val="bg1">
+                    <a:lumMod val="50000"/>
+                  </a:schemeClr>
+                </a:solidFill>
+              </a:rPr>
+              <a:t>L</a:t>
+            </a:r>
+            <a:r>
+              <a:rPr lang="en-US" sz="2353" dirty="0" err="1" smtClean="0">
+                <a:solidFill>
+                  <a:schemeClr val="bg1">
+                    <a:lumMod val="50000"/>
+                  </a:schemeClr>
+                </a:solidFill>
+              </a:rPr>
+              <a:t>úcio</a:t>
+            </a:r>
+            <a:r>
+              <a:rPr lang="en-US" sz="2353" dirty="0" smtClean="0">
+                <a:solidFill>
+                  <a:schemeClr val="bg1">
+                    <a:lumMod val="50000"/>
+                  </a:schemeClr>
+                </a:solidFill>
+              </a:rPr>
+              <a:t> and Vincent </a:t>
+            </a:r>
+            <a:r>
+              <a:rPr lang="en-US" sz="2353" dirty="0" err="1" smtClean="0">
+                <a:solidFill>
+                  <a:schemeClr val="bg1">
+                    <a:lumMod val="50000"/>
+                  </a:schemeClr>
+                </a:solidFill>
+              </a:rPr>
+              <a:t>Aravantinos</a:t>
+            </a:r>
+            <a:endParaRPr lang="en-US" sz="2353" dirty="0">
+              <a:solidFill>
+                <a:schemeClr val="bg1">
+                  <a:lumMod val="50000"/>
+                </a:schemeClr>
+              </a:solidFill>
+            </a:endParaRPr>
           </a:p>
         </p:txBody>
       </p:sp>
@@ -3273,25 +3342,13 @@
             </a:r>
             <a:r>
               <a:rPr lang="en-US" dirty="0" smtClean="0"/>
-              <a:t> AG is </a:t>
-            </a:r>
+              <a:t> AG is currently</a:t>
+            </a:r>
+          </a:p>
+          <a:p>
             <a:r>
               <a:rPr lang="en-US" dirty="0" smtClean="0"/>
-              <a:t>currently</a:t>
-            </a:r>
-          </a:p>
-          <a:p>
-            <a:r>
-              <a:rPr lang="en-US" dirty="0" smtClean="0"/>
-              <a:t>building </a:t>
-            </a:r>
-            <a:r>
-              <a:rPr lang="en-US" dirty="0" smtClean="0"/>
-              <a:t>proprietary extensions</a:t>
-            </a:r>
-            <a:r>
-              <a:rPr lang="en-US" dirty="0" smtClean="0"/>
-              <a:t> to </a:t>
+              <a:t>building proprietary extensions to </a:t>
             </a:r>
             <a:r>
               <a:rPr lang="en-US" i="1" dirty="0" err="1" smtClean="0"/>
@@ -3299,11 +3356,7 @@
             </a:r>
             <a:r>
               <a:rPr lang="en-US" dirty="0" smtClean="0"/>
-              <a:t> to </a:t>
-            </a:r>
-            <a:r>
-              <a:rPr lang="en-US" dirty="0" smtClean="0"/>
-              <a:t>support data-flow modeling (</a:t>
+              <a:t> to support data-flow modeling (</a:t>
             </a:r>
             <a:r>
               <a:rPr lang="en-US" dirty="0" err="1" smtClean="0"/>
@@ -3325,7 +3378,6 @@
               <a:rPr lang="en-US" dirty="0" smtClean="0"/>
               <a:t>    </a:t>
             </a:r>
-            <a:endParaRPr lang="en-US" dirty="0" smtClean="0"/>
           </a:p>
           <a:p>
             <a:endParaRPr lang="en-US" dirty="0"/>
@@ -3630,17 +3682,7 @@
                   </a:schemeClr>
                 </a:solidFill>
               </a:rPr>
-              <a:t>Industrial</a:t>
-            </a:r>
-            <a:r>
-              <a:rPr lang="en-US" sz="1200" dirty="0" smtClean="0">
-                <a:solidFill>
-                  <a:schemeClr val="bg1">
-                    <a:lumMod val="50000"/>
-                  </a:schemeClr>
-                </a:solidFill>
-              </a:rPr>
-              <a:t> engine control</a:t>
+              <a:t>Industrial engine control</a:t>
             </a:r>
             <a:endParaRPr lang="en-US" sz="1200" dirty="0">
               <a:solidFill>
@@ -3734,47 +3776,7 @@
                   </a:schemeClr>
                 </a:solidFill>
               </a:rPr>
-              <a:t>Prototype</a:t>
-            </a:r>
-            <a:r>
-              <a:rPr lang="en-US" sz="1200" dirty="0" smtClean="0">
-                <a:solidFill>
-                  <a:schemeClr val="bg1">
-                    <a:lumMod val="50000"/>
-                  </a:schemeClr>
-                </a:solidFill>
-              </a:rPr>
-              <a:t> drill </a:t>
-            </a:r>
-            <a:r>
-              <a:rPr lang="en-US" sz="1200" dirty="0" smtClean="0">
-                <a:solidFill>
-                  <a:schemeClr val="bg1">
-                    <a:lumMod val="50000"/>
-                  </a:schemeClr>
-                </a:solidFill>
-              </a:rPr>
-              <a:t>m</a:t>
-            </a:r>
-            <a:r>
-              <a:rPr lang="en-US" sz="1200" dirty="0" smtClean="0">
-                <a:solidFill>
-                  <a:schemeClr val="bg1">
-                    <a:lumMod val="50000"/>
-                  </a:schemeClr>
-                </a:solidFill>
-              </a:rPr>
-              <a:t>achine control </a:t>
-            </a:r>
-            <a:r>
-              <a:rPr lang="en-US" sz="1200" dirty="0" smtClean="0">
-                <a:solidFill>
-                  <a:schemeClr val="bg1">
-                    <a:lumMod val="50000"/>
-                  </a:schemeClr>
-                </a:solidFill>
-              </a:rPr>
-              <a:t>software</a:t>
+              <a:t>Prototype drill machine control software</a:t>
             </a:r>
             <a:endParaRPr lang="en-US" sz="1200" dirty="0">
               <a:solidFill>
@@ -3858,37 +3860,7 @@
                   </a:schemeClr>
                 </a:solidFill>
               </a:rPr>
-              <a:t>Data</a:t>
-            </a:r>
-            <a:r>
-              <a:rPr lang="en-US" sz="1200" dirty="0" smtClean="0">
-                <a:solidFill>
-                  <a:schemeClr val="bg1">
-                    <a:lumMod val="50000"/>
-                  </a:schemeClr>
-                </a:solidFill>
-              </a:rPr>
-              <a:t> </a:t>
-            </a:r>
-            <a:r>
-              <a:rPr lang="en-US" sz="1200" dirty="0" smtClean="0">
-                <a:solidFill>
-                  <a:schemeClr val="bg1">
-                    <a:lumMod val="50000"/>
-                  </a:schemeClr>
-                </a:solidFill>
-              </a:rPr>
-              <a:t>s</a:t>
-            </a:r>
-            <a:r>
-              <a:rPr lang="en-US" sz="1200" dirty="0" smtClean="0">
-                <a:solidFill>
-                  <a:schemeClr val="bg1">
-                    <a:lumMod val="50000"/>
-                  </a:schemeClr>
-                </a:solidFill>
-              </a:rPr>
-              <a:t>tructure modeling</a:t>
+              <a:t>Data structure modeling</a:t>
             </a:r>
             <a:endParaRPr lang="en-US" sz="1200" dirty="0">
               <a:solidFill>
@@ -4038,19 +4010,7 @@
             </a:r>
             <a:r>
               <a:rPr lang="en-US" dirty="0" smtClean="0"/>
-              <a:t>capabilities </a:t>
-            </a:r>
-            <a:r>
-              <a:rPr lang="en-US" dirty="0" smtClean="0"/>
-              <a:t>to</a:t>
-            </a:r>
-            <a:r>
-              <a:rPr lang="en-US" dirty="0" smtClean="0"/>
-              <a:t> </a:t>
-            </a:r>
-            <a:r>
-              <a:rPr lang="en-US" dirty="0" smtClean="0"/>
-              <a:t>allow </a:t>
+              <a:t>capabilities to allow </a:t>
             </a:r>
             <a:r>
               <a:rPr lang="en-US" dirty="0"/>
@@ -4218,11 +4178,7 @@
           <a:p>
             <a:r>
               <a:rPr lang="en-US" dirty="0" smtClean="0"/>
-              <a:t>c</a:t>
-            </a:r>
-            <a:r>
-              <a:rPr lang="en-US" dirty="0" smtClean="0"/>
-              <a:t>urrently not enough for </a:t>
+              <a:t>currently not enough for </a:t>
             </a:r>
             <a:r>
               <a:rPr lang="en-US" i="1" dirty="0" err="1" smtClean="0"/>
@@ -4344,7 +4300,15 @@
             </a:r>
             <a:r>
               <a:rPr lang="en-US" sz="2400" dirty="0" smtClean="0"/>
-              <a:t>: Profiles compliant to industrial coding standards</a:t>
+              <a:t>: Profiles</a:t>
+            </a:r>
+            <a:r>
+              <a:rPr lang="en-US" sz="2400" dirty="0" smtClean="0"/>
+              <a:t> making code comply to industrial </a:t>
+            </a:r>
+            <a:r>
+              <a:rPr lang="en-US" sz="2400" dirty="0" smtClean="0"/>
+              <a:t>standards</a:t>
             </a:r>
             <a:br>
               <a:rPr lang="en-US" sz="2400" dirty="0" smtClean="0"/>
@@ -4358,7 +4322,15 @@
             </a:r>
             <a:r>
               <a:rPr lang="en-US" sz="3000" dirty="0" smtClean="0"/>
-              <a:t>: Integrate all these technical arguments into a logical certification (qualification??) argument of the C code generated by </a:t>
+              <a:t>: Integrate all these technical arguments into a logical certification</a:t>
+            </a:r>
+            <a:r>
+              <a:rPr lang="en-US" sz="3000" dirty="0" smtClean="0"/>
+              <a:t> argument </a:t>
+            </a:r>
+            <a:r>
+              <a:rPr lang="en-US" sz="3000" dirty="0" smtClean="0"/>
+              <a:t>of the C code generated by </a:t>
             </a:r>
             <a:r>
               <a:rPr lang="en-US" sz="3000" i="1" dirty="0" err="1" smtClean="0"/>
@@ -4418,7 +4390,7 @@
           <a:p>
             <a:r>
               <a:rPr lang="en-US" dirty="0" smtClean="0"/>
-              <a:t>Developers and Users</a:t>
+              <a:t>Project Management</a:t>
             </a:r>
             <a:endParaRPr lang="en-US" dirty="0"/>
           </a:p>
@@ -4436,9 +4408,14 @@
         </p:nvSpPr>
         <p:spPr>
           <a:xfrm>
-            <a:off x="720271" y="2413000"/>
-            <a:ext cx="3071586" cy="3885520"/>
+            <a:off x="720270" y="2773242"/>
+            <a:ext cx="4014691" cy="2614639"/>
           </a:xfrm>
+          <a:solidFill>
+            <a:schemeClr val="bg1">
+              <a:lumMod val="85000"/>
+            </a:schemeClr>
+          </a:solidFill>
         </p:spPr>
         <p:txBody>
           <a:bodyPr>
@@ -4447,111 +4424,93 @@
           <a:lstStyle/>
           <a:p>
             <a:r>
-              <a:rPr lang="en-US" sz="2000" dirty="0" smtClean="0"/>
+              <a:rPr lang="en-US" sz="2000" dirty="0" err="1" smtClean="0"/>
+              <a:t>fortiss</a:t>
+            </a:r>
+            <a:endParaRPr lang="en-US" sz="2000" dirty="0" smtClean="0"/>
+          </a:p>
+          <a:p>
+            <a:pPr lvl="1"/>
+            <a:r>
+              <a:rPr lang="en-US" sz="1600" dirty="0" smtClean="0"/>
               <a:t>Levi </a:t>
             </a:r>
             <a:r>
+              <a:rPr lang="en-US" sz="1600" dirty="0" err="1" smtClean="0"/>
+              <a:t>Lúcio</a:t>
+            </a:r>
+            <a:r>
+              <a:rPr lang="en-US" sz="1600" dirty="0" smtClean="0"/>
+              <a:t> (1/2 time)</a:t>
+            </a:r>
+          </a:p>
+          <a:p>
+            <a:pPr lvl="1"/>
+            <a:r>
+              <a:rPr lang="en-US" sz="1600" dirty="0" smtClean="0"/>
+              <a:t>Research staff member (1/2 time)</a:t>
+            </a:r>
+          </a:p>
+          <a:p>
+            <a:pPr lvl="1"/>
+            <a:r>
+              <a:rPr lang="en-US" sz="1600" dirty="0" smtClean="0"/>
+              <a:t>M.Sc. student</a:t>
+            </a:r>
+          </a:p>
+          <a:p>
+            <a:pPr lvl="1"/>
+            <a:r>
+              <a:rPr lang="en-US" sz="1600" dirty="0" err="1" smtClean="0"/>
+              <a:t>HiWi</a:t>
+            </a:r>
+            <a:r>
+              <a:rPr lang="en-US" sz="1600" dirty="0" smtClean="0"/>
+              <a:t> student</a:t>
+            </a:r>
+          </a:p>
+          <a:p>
+            <a:r>
               <a:rPr lang="en-US" sz="2000" dirty="0" err="1" smtClean="0"/>
-              <a:t>L</a:t>
+              <a:t>i</a:t>
             </a:r>
             <a:r>
               <a:rPr lang="en-US" sz="2000" dirty="0" err="1" smtClean="0"/>
-              <a:t>úcio</a:t>
+              <a:t>temis</a:t>
             </a:r>
             <a:endParaRPr lang="en-US" sz="2000" dirty="0" smtClean="0"/>
           </a:p>
           <a:p>
-            <a:r>
-              <a:rPr lang="en-US" sz="2000" dirty="0" err="1" smtClean="0"/>
-              <a:t>Zaur</a:t>
-            </a:r>
-            <a:r>
-              <a:rPr lang="en-US" sz="2000" dirty="0" smtClean="0"/>
+            <a:pPr lvl="1"/>
+            <a:r>
+              <a:rPr lang="en-US" sz="1600" dirty="0" smtClean="0"/>
+              <a:t>Markus </a:t>
+            </a:r>
+            <a:r>
+              <a:rPr lang="en-US" sz="1600" dirty="0" err="1" smtClean="0"/>
+              <a:t>Voelter</a:t>
+            </a:r>
+            <a:endParaRPr lang="en-US" sz="1600" dirty="0" smtClean="0"/>
+          </a:p>
+          <a:p>
+            <a:pPr lvl="1"/>
+            <a:r>
+              <a:rPr lang="en-US" sz="1600" dirty="0" smtClean="0"/>
+              <a:t>the </a:t>
+            </a:r>
+            <a:r>
+              <a:rPr lang="en-US" sz="1600" i="1" dirty="0" err="1" smtClean="0"/>
+              <a:t>mbeddr</a:t>
+            </a:r>
+            <a:r>
+              <a:rPr lang="en-US" sz="1600" i="1" dirty="0" smtClean="0"/>
               <a:t> </a:t>
             </a:r>
             <a:r>
-              <a:rPr lang="en-US" sz="2000" dirty="0" err="1" smtClean="0"/>
-              <a:t>Molotnikov</a:t>
+              <a:rPr lang="en-US" sz="1600" dirty="0" smtClean="0"/>
+              <a:t>team</a:t>
             </a:r>
             <a:endParaRPr lang="en-US" sz="2000" dirty="0" smtClean="0"/>
-          </a:p>
-          <a:p>
-            <a:r>
-              <a:rPr lang="en-US" sz="2000" dirty="0" err="1" smtClean="0"/>
-              <a:t>Itemis</a:t>
-            </a:r>
-            <a:r>
-              <a:rPr lang="en-US" sz="2000" dirty="0" smtClean="0"/>
-              <a:t> (with financing??)</a:t>
-            </a:r>
-          </a:p>
-          <a:p>
-            <a:pPr lvl="1"/>
-            <a:r>
-              <a:rPr lang="en-US" sz="2000" dirty="0" smtClean="0"/>
-              <a:t>Markus </a:t>
-            </a:r>
-            <a:r>
-              <a:rPr lang="en-US" sz="2000" dirty="0" err="1" smtClean="0"/>
-              <a:t>Voelter</a:t>
-            </a:r>
-            <a:endParaRPr lang="en-US" sz="2000" dirty="0" smtClean="0"/>
-          </a:p>
-          <a:p>
-            <a:pPr lvl="1"/>
-            <a:r>
-              <a:rPr lang="en-US" sz="2000" dirty="0" smtClean="0"/>
-              <a:t>t</a:t>
-            </a:r>
-            <a:r>
-              <a:rPr lang="en-US" sz="2000" dirty="0" smtClean="0"/>
-              <a:t>he </a:t>
-            </a:r>
-            <a:r>
-              <a:rPr lang="en-US" sz="2000" i="1" dirty="0" err="1" smtClean="0"/>
-              <a:t>mbeddr</a:t>
-            </a:r>
-            <a:r>
-              <a:rPr lang="en-US" sz="2000" i="1" dirty="0" smtClean="0"/>
-              <a:t> </a:t>
-            </a:r>
-            <a:r>
-              <a:rPr lang="en-US" sz="2000" dirty="0" smtClean="0"/>
-              <a:t>team</a:t>
-            </a:r>
-            <a:endParaRPr lang="en-US" sz="2400" dirty="0" smtClean="0"/>
-          </a:p>
-          <a:p>
-            <a:r>
-              <a:rPr lang="en-US" sz="2054" dirty="0" err="1" smtClean="0"/>
-              <a:t>Benley</a:t>
-            </a:r>
-            <a:r>
-              <a:rPr lang="en-US" sz="2054" dirty="0" smtClean="0"/>
-              <a:t> Oakes</a:t>
-            </a:r>
-            <a:br>
-              <a:rPr lang="en-US" sz="2054" dirty="0" smtClean="0"/>
-            </a:br>
-            <a:r>
-              <a:rPr lang="en-US" sz="2054" dirty="0" smtClean="0"/>
-              <a:t>(McGill University)</a:t>
-            </a:r>
-          </a:p>
-          <a:p>
-            <a:r>
-              <a:rPr lang="en-US" sz="2054" dirty="0" err="1" smtClean="0"/>
-              <a:t>Cl</a:t>
-            </a:r>
-            <a:r>
-              <a:rPr lang="en-US" sz="2054" dirty="0" err="1" smtClean="0"/>
-              <a:t>áudio</a:t>
-            </a:r>
-            <a:r>
-              <a:rPr lang="en-US" sz="2054" dirty="0" smtClean="0"/>
-              <a:t> Gomes (University of Antwerp)</a:t>
-            </a:r>
-            <a:endParaRPr lang="en-US" sz="2054" dirty="0" smtClean="0"/>
           </a:p>
         </p:txBody>
       </p:sp>
@@ -4563,20 +4522,25 @@
         </p:nvSpPr>
         <p:spPr>
           <a:xfrm>
-            <a:off x="1469571" y="1626709"/>
-            <a:ext cx="1818376" cy="523220"/>
+            <a:off x="720271" y="2250022"/>
+            <a:ext cx="4014690" cy="523220"/>
           </a:xfrm>
           <a:prstGeom prst="rect">
             <a:avLst/>
           </a:prstGeom>
-          <a:noFill/>
+          <a:solidFill>
+            <a:schemeClr val="bg1">
+              <a:lumMod val="85000"/>
+            </a:schemeClr>
+          </a:solidFill>
         </p:spPr>
         <p:txBody>
-          <a:bodyPr wrap="none" rtlCol="0">
+          <a:bodyPr wrap="square" rtlCol="0">
             <a:spAutoFit/>
           </a:bodyPr>
           <a:lstStyle/>
           <a:p>
+            <a:pPr algn="ctr"/>
             <a:r>
               <a:rPr lang="en-US" sz="2800" dirty="0" smtClean="0"/>
               <a:t>Developers</a:t>
@@ -4593,23 +4557,35 @@
         </p:nvSpPr>
         <p:spPr>
           <a:xfrm>
-            <a:off x="5773938" y="1626709"/>
-            <a:ext cx="993631" cy="523220"/>
+            <a:off x="5150599" y="2250022"/>
+            <a:ext cx="3071586" cy="954107"/>
           </a:xfrm>
           <a:prstGeom prst="rect">
             <a:avLst/>
           </a:prstGeom>
-          <a:noFill/>
+          <a:solidFill>
+            <a:schemeClr val="bg1">
+              <a:lumMod val="85000"/>
+            </a:schemeClr>
+          </a:solidFill>
         </p:spPr>
         <p:txBody>
-          <a:bodyPr wrap="none" rtlCol="0">
+          <a:bodyPr wrap="square" rtlCol="0">
             <a:spAutoFit/>
           </a:bodyPr>
           <a:lstStyle/>
           <a:p>
+            <a:pPr algn="ctr"/>
             <a:r>
               <a:rPr lang="en-US" sz="2800" dirty="0" smtClean="0"/>
-              <a:t>Users</a:t>
+              <a:t>Industrial Partners</a:t>
+            </a:r>
+          </a:p>
+          <a:p>
+            <a:pPr algn="ctr"/>
+            <a:r>
+              <a:rPr lang="en-US" sz="2800" dirty="0" smtClean="0"/>
+              <a:t>and financing</a:t>
             </a:r>
             <a:endParaRPr lang="en-US" sz="2800" dirty="0"/>
           </a:p>
@@ -4625,18 +4601,92 @@
         </p:nvSpPr>
         <p:spPr>
           <a:xfrm>
-            <a:off x="4734961" y="2413000"/>
-            <a:ext cx="3071586" cy="3885520"/>
+            <a:off x="5150598" y="3204129"/>
+            <a:ext cx="3071586" cy="2183752"/>
           </a:xfrm>
           <a:prstGeom prst="rect">
             <a:avLst/>
           </a:prstGeom>
+          <a:solidFill>
+            <a:schemeClr val="bg1">
+              <a:lumMod val="85000"/>
+            </a:schemeClr>
+          </a:solidFill>
         </p:spPr>
         <p:txBody>
           <a:bodyPr vert="horz" lIns="91440" tIns="45720" rIns="91440" bIns="45720" rtlCol="0">
             <a:normAutofit/>
           </a:bodyPr>
           <a:lstStyle/>
+          <a:p>
+            <a:pPr marL="342900" lvl="0" indent="-342900">
+              <a:spcBef>
+                <a:spcPct val="20000"/>
+              </a:spcBef>
+              <a:buFont typeface="Arial"/>
+              <a:buChar char="•"/>
+              <a:defRPr/>
+            </a:pPr>
+            <a:r>
+              <a:rPr lang="en-US" sz="2000" dirty="0" err="1" smtClean="0"/>
+              <a:t>i</a:t>
+            </a:r>
+            <a:r>
+              <a:rPr kumimoji="0" lang="en-US" sz="2000" b="0" i="0" u="none" strike="noStrike" kern="1200" cap="none" spc="0" normalizeH="0" baseline="0" noProof="0" dirty="0" err="1" smtClean="0">
+                <a:ln>
+                  <a:noFill/>
+                </a:ln>
+                <a:solidFill>
+                  <a:schemeClr val="tx1"/>
+                </a:solidFill>
+                <a:effectLst/>
+                <a:uLnTx/>
+                <a:uFillTx/>
+                <a:latin typeface="+mn-lt"/>
+                <a:ea typeface="+mn-ea"/>
+                <a:cs typeface="+mn-cs"/>
+              </a:rPr>
+              <a:t>temis</a:t>
+            </a:r>
+            <a:r>
+              <a:rPr kumimoji="0" lang="en-US" sz="2000" b="0" i="0" u="none" strike="noStrike" kern="1200" cap="none" spc="0" normalizeH="0" baseline="0" noProof="0" dirty="0" smtClean="0">
+                <a:ln>
+                  <a:noFill/>
+                </a:ln>
+                <a:solidFill>
+                  <a:schemeClr val="tx1"/>
+                </a:solidFill>
+                <a:effectLst/>
+                <a:uLnTx/>
+                <a:uFillTx/>
+                <a:latin typeface="+mn-lt"/>
+                <a:ea typeface="+mn-ea"/>
+                <a:cs typeface="+mn-cs"/>
+              </a:rPr>
+              <a:t> (</a:t>
+            </a:r>
+            <a:r>
+              <a:rPr lang="en-US" sz="2000" dirty="0" smtClean="0"/>
+              <a:t>€4000</a:t>
+            </a:r>
+            <a:r>
+              <a:rPr kumimoji="0" lang="en-US" sz="2000" b="0" i="0" u="none" strike="noStrike" kern="1200" cap="none" spc="0" normalizeH="0" baseline="0" noProof="0" dirty="0" smtClean="0">
+                <a:ln>
+                  <a:noFill/>
+                </a:ln>
+                <a:solidFill>
+                  <a:schemeClr val="tx1"/>
+                </a:solidFill>
+                <a:effectLst/>
+                <a:uLnTx/>
+                <a:uFillTx/>
+                <a:latin typeface="+mn-lt"/>
+                <a:ea typeface="+mn-ea"/>
+                <a:cs typeface="+mn-cs"/>
+              </a:rPr>
+              <a:t>)</a:t>
+            </a:r>
+          </a:p>
           <a:p>
             <a:pPr marL="342900" marR="0" lvl="0" indent="-342900" algn="l" defTabSz="457200" rtl="0" eaLnBrk="1" fontAlgn="auto" latinLnBrk="0" hangingPunct="1">
               <a:lnSpc>
@@ -4656,7 +4706,7 @@
               <a:defRPr/>
             </a:pPr>
             <a:r>
-              <a:rPr kumimoji="0" lang="en-US" sz="2000" b="0" i="0" u="none" strike="noStrike" kern="1200" cap="none" spc="0" normalizeH="0" baseline="0" noProof="0" dirty="0" err="1" smtClean="0">
+              <a:rPr kumimoji="0" lang="en-US" sz="2000" b="0" i="0" u="none" strike="noStrike" kern="1200" cap="none" spc="0" normalizeH="0" baseline="0" noProof="0" dirty="0" smtClean="0">
                 <a:ln>
                   <a:noFill/>
                 </a:ln>
@@ -4670,61 +4720,10 @@
                 <a:ea typeface="+mn-ea"/>
                 <a:cs typeface="+mn-cs"/>
               </a:rPr>
-              <a:t>Itemis</a:t>
-            </a:r>
-            <a:endParaRPr kumimoji="0" lang="en-US" sz="2000" b="0" i="0" u="none" strike="noStrike" kern="1200" cap="none" spc="0" normalizeH="0" baseline="0" noProof="0" dirty="0" smtClean="0">
-              <a:ln>
-                <a:noFill/>
-              </a:ln>
-              <a:solidFill>
-                <a:schemeClr val="tx1"/>
-              </a:solidFill>
-              <a:effectLst/>
-              <a:uLnTx/>
-              <a:uFillTx/>
-              <a:latin typeface="+mn-lt"/>
-              <a:ea typeface="+mn-ea"/>
-              <a:cs typeface="+mn-cs"/>
-            </a:endParaRPr>
-          </a:p>
-          <a:p>
-            <a:pPr marL="342900" lvl="0" indent="-342900">
-              <a:spcBef>
-                <a:spcPct val="20000"/>
-              </a:spcBef>
-              <a:buFont typeface="Arial"/>
-              <a:buChar char="•"/>
-            </a:pPr>
-            <a:r>
-              <a:rPr lang="en-US" sz="2000" dirty="0" smtClean="0"/>
-              <a:t>OHB (Aerospace) </a:t>
-            </a:r>
-            <a:r>
-              <a:rPr lang="en-US" sz="2000" dirty="0" smtClean="0"/>
-              <a:t>(with financing??)</a:t>
-            </a:r>
-            <a:endParaRPr lang="en-US" sz="2000" dirty="0" smtClean="0"/>
-          </a:p>
-          <a:p>
-            <a:pPr marL="342900" marR="0" lvl="0" indent="-342900" algn="l" defTabSz="457200" rtl="0" eaLnBrk="1" fontAlgn="auto" latinLnBrk="0" hangingPunct="1">
-              <a:lnSpc>
-                <a:spcPct val="100000"/>
-              </a:lnSpc>
-              <a:spcBef>
-                <a:spcPct val="20000"/>
-              </a:spcBef>
-              <a:spcAft>
-                <a:spcPts val="0"/>
-              </a:spcAft>
-              <a:buClrTx/>
-              <a:buSzTx/>
-              <a:buFont typeface="Arial"/>
-              <a:buChar char="•"/>
-              <a:tabLst/>
-              <a:defRPr/>
-            </a:pPr>
-            <a:r>
-              <a:rPr kumimoji="0" lang="en-US" sz="2000" b="0" i="0" u="none" strike="noStrike" kern="1200" cap="none" spc="0" normalizeH="0" baseline="0" noProof="0" dirty="0" err="1" smtClean="0">
+              <a:t>Siemens</a:t>
+            </a:r>
+            <a:r>
+              <a:rPr kumimoji="0" lang="en-US" sz="2000" b="0" i="0" u="none" strike="noStrike" kern="1200" cap="none" spc="0" normalizeH="0" noProof="0" dirty="0" smtClean="0">
                 <a:ln>
                   <a:noFill/>
                 </a:ln>
@@ -4738,7 +4737,25 @@
                 <a:ea typeface="+mn-ea"/>
                 <a:cs typeface="+mn-cs"/>
               </a:rPr>
-              <a:t>JetBRAINS</a:t>
+              <a:t> (€5000)</a:t>
+            </a:r>
+          </a:p>
+          <a:p>
+            <a:pPr marL="342900" indent="-342900">
+              <a:spcBef>
+                <a:spcPct val="20000"/>
+              </a:spcBef>
+              <a:buFont typeface="Arial"/>
+              <a:buChar char="•"/>
+              <a:defRPr/>
+            </a:pPr>
+            <a:r>
+              <a:rPr lang="en-US" sz="2000" dirty="0" smtClean="0"/>
+              <a:t>OHB (Aerospace) </a:t>
+            </a:r>
+            <a:r>
+              <a:rPr lang="en-US" sz="2000" dirty="0" smtClean="0"/>
+              <a:t>(financing possible in the future)</a:t>
             </a:r>
             <a:endParaRPr kumimoji="0" lang="en-US" sz="2000" b="0" i="0" u="none" strike="noStrike" kern="1200" cap="none" spc="0" normalizeH="0" baseline="0" noProof="0" dirty="0" smtClean="0">
               <a:ln>
@@ -4788,41 +4805,288 @@
               <a:cs typeface="+mn-cs"/>
             </a:endParaRPr>
           </a:p>
-          <a:p>
-            <a:pPr marL="342900" marR="0" lvl="0" indent="-342900" algn="l" defTabSz="457200" rtl="0" eaLnBrk="1" fontAlgn="auto" latinLnBrk="0" hangingPunct="1">
-              <a:lnSpc>
-                <a:spcPct val="100000"/>
-              </a:lnSpc>
-              <a:spcBef>
-                <a:spcPct val="20000"/>
-              </a:spcBef>
-              <a:spcAft>
-                <a:spcPts val="0"/>
-              </a:spcAft>
-              <a:buClrTx/>
-              <a:buSzTx/>
-              <a:buFont typeface="Arial"/>
-              <a:buChar char="•"/>
-              <a:tabLst/>
-              <a:defRPr/>
-            </a:pPr>
-            <a:endParaRPr kumimoji="0" lang="en-US" sz="2000" b="0" i="0" u="none" strike="noStrike" kern="1200" cap="none" spc="0" normalizeH="0" baseline="0" noProof="0" dirty="0" smtClean="0">
-              <a:ln>
-                <a:noFill/>
-              </a:ln>
-              <a:solidFill>
-                <a:schemeClr val="tx1"/>
-              </a:solidFill>
-              <a:effectLst/>
-              <a:uLnTx/>
-              <a:uFillTx/>
-              <a:latin typeface="+mn-lt"/>
-              <a:ea typeface="+mn-ea"/>
-              <a:cs typeface="+mn-cs"/>
-            </a:endParaRPr>
-          </a:p>
-        </p:txBody>
-      </p:sp>
+        </p:txBody>
+      </p:sp>
+      <p:grpSp>
+        <p:nvGrpSpPr>
+          <p:cNvPr id="12" name="Group 11"/>
+          <p:cNvGrpSpPr/>
+          <p:nvPr/>
+        </p:nvGrpSpPr>
+        <p:grpSpPr>
+          <a:xfrm>
+            <a:off x="2609272" y="5505704"/>
+            <a:ext cx="3940848" cy="1169551"/>
+            <a:chOff x="2609272" y="5403785"/>
+            <a:chExt cx="3940848" cy="1169551"/>
+          </a:xfrm>
+          <a:solidFill>
+            <a:schemeClr val="bg1">
+              <a:lumMod val="85000"/>
+            </a:schemeClr>
+          </a:solidFill>
+        </p:grpSpPr>
+        <p:sp>
+          <p:nvSpPr>
+            <p:cNvPr id="9" name="Rectangle 8"/>
+            <p:cNvSpPr/>
+            <p:nvPr/>
+          </p:nvSpPr>
+          <p:spPr>
+            <a:xfrm>
+              <a:off x="2609272" y="5927005"/>
+              <a:ext cx="3940848" cy="646331"/>
+            </a:xfrm>
+            <a:prstGeom prst="rect">
+              <a:avLst/>
+            </a:prstGeom>
+            <a:grpFill/>
+          </p:spPr>
+          <p:txBody>
+            <a:bodyPr wrap="square">
+              <a:spAutoFit/>
+            </a:bodyPr>
+            <a:lstStyle/>
+            <a:p>
+              <a:r>
+                <a:rPr lang="en-US" dirty="0" smtClean="0"/>
+                <a:t>Bentley Oakes (</a:t>
+              </a:r>
+              <a:r>
+                <a:rPr lang="en-US" dirty="0" smtClean="0"/>
+                <a:t>McGill University)</a:t>
+              </a:r>
+            </a:p>
+            <a:p>
+              <a:r>
+                <a:rPr lang="en-US" dirty="0" err="1" smtClean="0"/>
+                <a:t>Cláudio</a:t>
+              </a:r>
+              <a:r>
+                <a:rPr lang="en-US" dirty="0" smtClean="0"/>
+                <a:t> Gomes (University of Antwerp)</a:t>
+              </a:r>
+            </a:p>
+          </p:txBody>
+        </p:sp>
+        <p:sp>
+          <p:nvSpPr>
+            <p:cNvPr id="10" name="TextBox 9"/>
+            <p:cNvSpPr txBox="1"/>
+            <p:nvPr/>
+          </p:nvSpPr>
+          <p:spPr>
+            <a:xfrm>
+              <a:off x="2609272" y="5403785"/>
+              <a:ext cx="3940848" cy="523220"/>
+            </a:xfrm>
+            <a:prstGeom prst="rect">
+              <a:avLst/>
+            </a:prstGeom>
+            <a:grpFill/>
+          </p:spPr>
+          <p:txBody>
+            <a:bodyPr wrap="square" rtlCol="0">
+              <a:spAutoFit/>
+            </a:bodyPr>
+            <a:lstStyle/>
+            <a:p>
+              <a:pPr algn="ctr"/>
+              <a:r>
+                <a:rPr lang="en-US" sz="2800" dirty="0" smtClean="0"/>
+                <a:t>Academic Partners</a:t>
+              </a:r>
+              <a:endParaRPr lang="en-US" sz="2800" dirty="0"/>
+            </a:p>
+          </p:txBody>
+        </p:sp>
+      </p:grpSp>
+      <p:sp>
+        <p:nvSpPr>
+          <p:cNvPr id="11" name="TextBox 10"/>
+          <p:cNvSpPr txBox="1"/>
+          <p:nvPr/>
+        </p:nvSpPr>
+        <p:spPr>
+          <a:xfrm>
+            <a:off x="2380432" y="1515168"/>
+            <a:ext cx="3782932" cy="523220"/>
+          </a:xfrm>
+          <a:prstGeom prst="rect">
+            <a:avLst/>
+          </a:prstGeom>
+          <a:solidFill>
+            <a:schemeClr val="bg1">
+              <a:lumMod val="85000"/>
+            </a:schemeClr>
+          </a:solidFill>
+        </p:spPr>
+        <p:txBody>
+          <a:bodyPr wrap="none" rtlCol="0">
+            <a:spAutoFit/>
+          </a:bodyPr>
+          <a:lstStyle/>
+          <a:p>
+            <a:r>
+              <a:rPr lang="en-US" sz="2800" dirty="0" smtClean="0"/>
+              <a:t>Project Duration: 2 </a:t>
+            </a:r>
+            <a:r>
+              <a:rPr lang="en-US" sz="2800" dirty="0" smtClean="0"/>
+              <a:t>years</a:t>
+            </a:r>
+            <a:endParaRPr lang="en-US" sz="2800" dirty="0"/>
+          </a:p>
+        </p:txBody>
+      </p:sp>
+    </p:spTree>
+  </p:cSld>
+  <p:clrMapOvr>
+    <a:masterClrMapping/>
+  </p:clrMapOvr>
+</p:sld>
+</file>
+
+<file path=ppt/slides/slide6.xml><?xml version="1.0" encoding="utf-8"?>
+<p:sld xmlns:a="http://schemas.openxmlformats.org/drawingml/2006/main" xmlns:r="http://schemas.openxmlformats.org/officeDocument/2006/relationships" xmlns:mc="http://schemas.openxmlformats.org/markup-compatibility/2006" xmlns:mv="urn:schemas-microsoft-com:mac:vml" xmlns:p="http://schemas.openxmlformats.org/presentationml/2006/main" mc:Ignorable="mv" mc:PreserveAttributes="mv:*">
+  <p:cSld>
+    <p:spTree>
+      <p:nvGrpSpPr>
+        <p:cNvPr id="1" name=""/>
+        <p:cNvGrpSpPr/>
+        <p:nvPr/>
+      </p:nvGrpSpPr>
+      <p:grpSpPr>
+        <a:xfrm>
+          <a:off x="0" y="0"/>
+          <a:ext cx="0" cy="0"/>
+          <a:chOff x="0" y="0"/>
+          <a:chExt cx="0" cy="0"/>
+        </a:xfrm>
+      </p:grpSpPr>
+      <p:sp>
+        <p:nvSpPr>
+          <p:cNvPr id="2" name="Title 1"/>
+          <p:cNvSpPr>
+            <a:spLocks noGrp="1"/>
+          </p:cNvSpPr>
+          <p:nvPr>
+            <p:ph type="title"/>
+          </p:nvPr>
+        </p:nvSpPr>
+        <p:spPr/>
+        <p:txBody>
+          <a:bodyPr>
+            <a:normAutofit fontScale="90000"/>
+          </a:bodyPr>
+          <a:lstStyle/>
+          <a:p>
+            <a:r>
+              <a:rPr lang="en-US" dirty="0" smtClean="0"/>
+              <a:t>Project Planning (work package view)</a:t>
+            </a:r>
+            <a:endParaRPr lang="en-US" dirty="0"/>
+          </a:p>
+        </p:txBody>
+      </p:sp>
+      <p:pic>
+        <p:nvPicPr>
+          <p:cNvPr id="4" name="Picture 3" descr="simple_Gantt.png"/>
+          <p:cNvPicPr>
+            <a:picLocks noChangeAspect="1"/>
+          </p:cNvPicPr>
+          <p:nvPr/>
+        </p:nvPicPr>
+        <p:blipFill>
+          <a:blip r:embed="rId2"/>
+          <a:stretch>
+            <a:fillRect/>
+          </a:stretch>
+        </p:blipFill>
+        <p:spPr>
+          <a:xfrm>
+            <a:off x="1384440" y="2110806"/>
+            <a:ext cx="6684902" cy="3430654"/>
+          </a:xfrm>
+          <a:prstGeom prst="rect">
+            <a:avLst/>
+          </a:prstGeom>
+        </p:spPr>
+      </p:pic>
+    </p:spTree>
+  </p:cSld>
+  <p:clrMapOvr>
+    <a:masterClrMapping/>
+  </p:clrMapOvr>
+</p:sld>
+</file>
+
+<file path=ppt/slides/slide7.xml><?xml version="1.0" encoding="utf-8"?>
+<p:sld xmlns:a="http://schemas.openxmlformats.org/drawingml/2006/main" xmlns:r="http://schemas.openxmlformats.org/officeDocument/2006/relationships" xmlns:mc="http://schemas.openxmlformats.org/markup-compatibility/2006" xmlns:mv="urn:schemas-microsoft-com:mac:vml" xmlns:p="http://schemas.openxmlformats.org/presentationml/2006/main" mc:Ignorable="mv" mc:PreserveAttributes="mv:*">
+  <p:cSld>
+    <p:spTree>
+      <p:nvGrpSpPr>
+        <p:cNvPr id="1" name=""/>
+        <p:cNvGrpSpPr/>
+        <p:nvPr/>
+      </p:nvGrpSpPr>
+      <p:grpSpPr>
+        <a:xfrm>
+          <a:off x="0" y="0"/>
+          <a:ext cx="0" cy="0"/>
+          <a:chOff x="0" y="0"/>
+          <a:chExt cx="0" cy="0"/>
+        </a:xfrm>
+      </p:grpSpPr>
+      <p:sp>
+        <p:nvSpPr>
+          <p:cNvPr id="2" name="Title 1"/>
+          <p:cNvSpPr>
+            <a:spLocks noGrp="1"/>
+          </p:cNvSpPr>
+          <p:nvPr>
+            <p:ph type="title"/>
+          </p:nvPr>
+        </p:nvSpPr>
+        <p:spPr/>
+        <p:txBody>
+          <a:bodyPr>
+            <a:normAutofit/>
+          </a:bodyPr>
+          <a:lstStyle/>
+          <a:p>
+            <a:r>
+              <a:rPr lang="en-US" dirty="0" smtClean="0"/>
+              <a:t>Project Planning (task view)</a:t>
+            </a:r>
+            <a:endParaRPr lang="en-US" dirty="0"/>
+          </a:p>
+        </p:txBody>
+      </p:sp>
+      <p:pic>
+        <p:nvPicPr>
+          <p:cNvPr id="5" name="Picture 4" descr="detailed_Gantt.png"/>
+          <p:cNvPicPr>
+            <a:picLocks noChangeAspect="1"/>
+          </p:cNvPicPr>
+          <p:nvPr/>
+        </p:nvPicPr>
+        <p:blipFill>
+          <a:blip r:embed="rId2"/>
+          <a:stretch>
+            <a:fillRect/>
+          </a:stretch>
+        </p:blipFill>
+        <p:spPr>
+          <a:xfrm>
+            <a:off x="-1" y="1984153"/>
+            <a:ext cx="9144001" cy="3114675"/>
+          </a:xfrm>
+          <a:prstGeom prst="rect">
+            <a:avLst/>
+          </a:prstGeom>
+        </p:spPr>
+      </p:pic>
     </p:spTree>
   </p:cSld>
   <p:clrMapOvr>

</xml_diff>

<commit_message>
integrating comments from Vincent
</commit_message>
<xml_diff>
--- a/presentations/cert-mbeddr.pptx
+++ b/presentations/cert-mbeddr.pptx
@@ -295,7 +295,7 @@
             <a:fld id="{FC42F63F-51B3-7C45-839B-1232DC311CC3}" type="datetimeFigureOut">
               <a:rPr lang="en-US" smtClean="0"/>
               <a:pPr/>
-              <a:t>2/2/16</a:t>
+              <a:t>2/10/16</a:t>
             </a:fld>
             <a:endParaRPr lang="en-US"/>
           </a:p>
@@ -462,7 +462,7 @@
             <a:fld id="{FC42F63F-51B3-7C45-839B-1232DC311CC3}" type="datetimeFigureOut">
               <a:rPr lang="en-US" smtClean="0"/>
               <a:pPr/>
-              <a:t>2/2/16</a:t>
+              <a:t>2/10/16</a:t>
             </a:fld>
             <a:endParaRPr lang="en-US"/>
           </a:p>
@@ -639,7 +639,7 @@
             <a:fld id="{FC42F63F-51B3-7C45-839B-1232DC311CC3}" type="datetimeFigureOut">
               <a:rPr lang="en-US" smtClean="0"/>
               <a:pPr/>
-              <a:t>2/2/16</a:t>
+              <a:t>2/10/16</a:t>
             </a:fld>
             <a:endParaRPr lang="en-US"/>
           </a:p>
@@ -806,7 +806,7 @@
             <a:fld id="{FC42F63F-51B3-7C45-839B-1232DC311CC3}" type="datetimeFigureOut">
               <a:rPr lang="en-US" smtClean="0"/>
               <a:pPr/>
-              <a:t>2/2/16</a:t>
+              <a:t>2/10/16</a:t>
             </a:fld>
             <a:endParaRPr lang="en-US"/>
           </a:p>
@@ -1049,7 +1049,7 @@
             <a:fld id="{FC42F63F-51B3-7C45-839B-1232DC311CC3}" type="datetimeFigureOut">
               <a:rPr lang="en-US" smtClean="0"/>
               <a:pPr/>
-              <a:t>2/2/16</a:t>
+              <a:t>2/10/16</a:t>
             </a:fld>
             <a:endParaRPr lang="en-US"/>
           </a:p>
@@ -1334,7 +1334,7 @@
             <a:fld id="{FC42F63F-51B3-7C45-839B-1232DC311CC3}" type="datetimeFigureOut">
               <a:rPr lang="en-US" smtClean="0"/>
               <a:pPr/>
-              <a:t>2/2/16</a:t>
+              <a:t>2/10/16</a:t>
             </a:fld>
             <a:endParaRPr lang="en-US"/>
           </a:p>
@@ -1753,7 +1753,7 @@
             <a:fld id="{FC42F63F-51B3-7C45-839B-1232DC311CC3}" type="datetimeFigureOut">
               <a:rPr lang="en-US" smtClean="0"/>
               <a:pPr/>
-              <a:t>2/2/16</a:t>
+              <a:t>2/10/16</a:t>
             </a:fld>
             <a:endParaRPr lang="en-US"/>
           </a:p>
@@ -1868,7 +1868,7 @@
             <a:fld id="{FC42F63F-51B3-7C45-839B-1232DC311CC3}" type="datetimeFigureOut">
               <a:rPr lang="en-US" smtClean="0"/>
               <a:pPr/>
-              <a:t>2/2/16</a:t>
+              <a:t>2/10/16</a:t>
             </a:fld>
             <a:endParaRPr lang="en-US"/>
           </a:p>
@@ -1960,7 +1960,7 @@
             <a:fld id="{FC42F63F-51B3-7C45-839B-1232DC311CC3}" type="datetimeFigureOut">
               <a:rPr lang="en-US" smtClean="0"/>
               <a:pPr/>
-              <a:t>2/2/16</a:t>
+              <a:t>2/10/16</a:t>
             </a:fld>
             <a:endParaRPr lang="en-US"/>
           </a:p>
@@ -2234,7 +2234,7 @@
             <a:fld id="{FC42F63F-51B3-7C45-839B-1232DC311CC3}" type="datetimeFigureOut">
               <a:rPr lang="en-US" smtClean="0"/>
               <a:pPr/>
-              <a:t>2/2/16</a:t>
+              <a:t>2/10/16</a:t>
             </a:fld>
             <a:endParaRPr lang="en-US"/>
           </a:p>
@@ -2484,7 +2484,7 @@
             <a:fld id="{FC42F63F-51B3-7C45-839B-1232DC311CC3}" type="datetimeFigureOut">
               <a:rPr lang="en-US" smtClean="0"/>
               <a:pPr/>
-              <a:t>2/2/16</a:t>
+              <a:t>2/10/16</a:t>
             </a:fld>
             <a:endParaRPr lang="en-US"/>
           </a:p>
@@ -2694,7 +2694,7 @@
             <a:fld id="{FC42F63F-51B3-7C45-839B-1232DC311CC3}" type="datetimeFigureOut">
               <a:rPr lang="en-US" smtClean="0"/>
               <a:pPr/>
-              <a:t>2/2/16</a:t>
+              <a:t>2/10/16</a:t>
             </a:fld>
             <a:endParaRPr lang="en-US"/>
           </a:p>
@@ -3117,11 +3117,7 @@
           <a:p>
             <a:r>
               <a:rPr lang="en-US" dirty="0" smtClean="0"/>
-              <a:t>Embedded Software in </a:t>
-            </a:r>
-            <a:r>
-              <a:rPr lang="en-US" dirty="0" smtClean="0"/>
-              <a:t>C</a:t>
+              <a:t>Embedded Software in C</a:t>
             </a:r>
           </a:p>
           <a:p>
@@ -3146,17 +3142,7 @@
                   </a:schemeClr>
                 </a:solidFill>
               </a:rPr>
-              <a:t>L</a:t>
-            </a:r>
-            <a:r>
-              <a:rPr lang="en-US" sz="2353" dirty="0" err="1" smtClean="0">
-                <a:solidFill>
-                  <a:schemeClr val="bg1">
-                    <a:lumMod val="50000"/>
-                  </a:schemeClr>
-                </a:solidFill>
-              </a:rPr>
-              <a:t>úcio</a:t>
+              <a:t>Lúcio</a:t>
             </a:r>
             <a:r>
               <a:rPr lang="en-US" sz="2353" dirty="0" smtClean="0">
@@ -4300,15 +4286,7 @@
             </a:r>
             <a:r>
               <a:rPr lang="en-US" sz="2400" dirty="0" smtClean="0"/>
-              <a:t>: Profiles</a:t>
-            </a:r>
-            <a:r>
-              <a:rPr lang="en-US" sz="2400" dirty="0" smtClean="0"/>
-              <a:t> making code comply to industrial </a:t>
-            </a:r>
-            <a:r>
-              <a:rPr lang="en-US" sz="2400" dirty="0" smtClean="0"/>
-              <a:t>standards</a:t>
+              <a:t>: Profiles making code comply to industrial standards</a:t>
             </a:r>
             <a:br>
               <a:rPr lang="en-US" sz="2400" dirty="0" smtClean="0"/>
@@ -4322,15 +4300,7 @@
             </a:r>
             <a:r>
               <a:rPr lang="en-US" sz="3000" dirty="0" smtClean="0"/>
-              <a:t>: Integrate all these technical arguments into a logical certification</a:t>
-            </a:r>
-            <a:r>
-              <a:rPr lang="en-US" sz="3000" dirty="0" smtClean="0"/>
-              <a:t> argument </a:t>
-            </a:r>
-            <a:r>
-              <a:rPr lang="en-US" sz="3000" dirty="0" smtClean="0"/>
-              <a:t>of the C code generated by </a:t>
+              <a:t>: Integrate all these technical arguments into a logical certification argument of the C code generated by </a:t>
             </a:r>
             <a:r>
               <a:rPr lang="en-US" sz="3000" i="1" dirty="0" err="1" smtClean="0"/>
@@ -4408,7 +4378,7 @@
         </p:nvSpPr>
         <p:spPr>
           <a:xfrm>
-            <a:off x="720270" y="2773242"/>
+            <a:off x="720270" y="2678545"/>
             <a:ext cx="4014691" cy="2614639"/>
           </a:xfrm>
           <a:solidFill>
@@ -4472,11 +4442,7 @@
           <a:p>
             <a:r>
               <a:rPr lang="en-US" sz="2000" dirty="0" err="1" smtClean="0"/>
-              <a:t>i</a:t>
-            </a:r>
-            <a:r>
-              <a:rPr lang="en-US" sz="2000" dirty="0" err="1" smtClean="0"/>
-              <a:t>temis</a:t>
+              <a:t>itemis</a:t>
             </a:r>
             <a:endParaRPr lang="en-US" sz="2000" dirty="0" smtClean="0"/>
           </a:p>
@@ -4522,7 +4488,7 @@
         </p:nvSpPr>
         <p:spPr>
           <a:xfrm>
-            <a:off x="720271" y="2250022"/>
+            <a:off x="720271" y="2155325"/>
             <a:ext cx="4014690" cy="523220"/>
           </a:xfrm>
           <a:prstGeom prst="rect">
@@ -4557,7 +4523,7 @@
         </p:nvSpPr>
         <p:spPr>
           <a:xfrm>
-            <a:off x="5150599" y="2250022"/>
+            <a:off x="5150598" y="2155325"/>
             <a:ext cx="3071586" cy="954107"/>
           </a:xfrm>
           <a:prstGeom prst="rect">
@@ -4601,7 +4567,7 @@
         </p:nvSpPr>
         <p:spPr>
           <a:xfrm>
-            <a:off x="5150598" y="3204129"/>
+            <a:off x="5150597" y="3109432"/>
             <a:ext cx="3071586" cy="2183752"/>
           </a:xfrm>
           <a:prstGeom prst="rect">
@@ -4751,11 +4717,7 @@
             </a:pPr>
             <a:r>
               <a:rPr lang="en-US" sz="2000" dirty="0" smtClean="0"/>
-              <a:t>OHB (Aerospace) </a:t>
-            </a:r>
-            <a:r>
-              <a:rPr lang="en-US" sz="2000" dirty="0" smtClean="0"/>
-              <a:t>(financing possible in the future)</a:t>
+              <a:t>OHB (Aerospace) (financing possible in the future)</a:t>
             </a:r>
             <a:endParaRPr kumimoji="0" lang="en-US" sz="2000" b="0" i="0" u="none" strike="noStrike" kern="1200" cap="none" spc="0" normalizeH="0" baseline="0" noProof="0" dirty="0" smtClean="0">
               <a:ln>
@@ -4815,7 +4777,7 @@
         </p:nvGrpSpPr>
         <p:grpSpPr>
           <a:xfrm>
-            <a:off x="2609272" y="5505704"/>
+            <a:off x="2764537" y="5434100"/>
             <a:ext cx="3940848" cy="1169551"/>
             <a:chOff x="2609272" y="5403785"/>
             <a:chExt cx="3940848" cy="1169551"/>
@@ -4850,11 +4812,7 @@
             <a:p>
               <a:r>
                 <a:rPr lang="en-US" dirty="0" smtClean="0"/>
-                <a:t>Bentley Oakes (</a:t>
-              </a:r>
-              <a:r>
-                <a:rPr lang="en-US" dirty="0" smtClean="0"/>
-                <a:t>McGill University)</a:t>
+                <a:t>Bentley Oakes (McGill University)</a:t>
               </a:r>
             </a:p>
             <a:p>
@@ -4909,7 +4867,7 @@
         </p:nvSpPr>
         <p:spPr>
           <a:xfrm>
-            <a:off x="2380432" y="1515168"/>
+            <a:off x="2767188" y="1417638"/>
             <a:ext cx="3782932" cy="523220"/>
           </a:xfrm>
           <a:prstGeom prst="rect">
@@ -4929,11 +4887,7 @@
           <a:p>
             <a:r>
               <a:rPr lang="en-US" sz="2800" dirty="0" smtClean="0"/>
-              <a:t>Project Duration: 2 </a:t>
-            </a:r>
-            <a:r>
-              <a:rPr lang="en-US" sz="2800" dirty="0" smtClean="0"/>
-              <a:t>years</a:t>
+              <a:t>Project Duration: 2 years</a:t>
             </a:r>
             <a:endParaRPr lang="en-US" sz="2800" dirty="0"/>
           </a:p>
@@ -4991,7 +4945,7 @@
       </p:sp>
       <p:pic>
         <p:nvPicPr>
-          <p:cNvPr id="4" name="Picture 3" descr="simple_Gantt.png"/>
+          <p:cNvPr id="5" name="Picture 4" descr="simple_Gantt.png"/>
           <p:cNvPicPr>
             <a:picLocks noChangeAspect="1"/>
           </p:cNvPicPr>
@@ -5005,8 +4959,8 @@
         </p:blipFill>
         <p:spPr>
           <a:xfrm>
-            <a:off x="1384440" y="2110806"/>
-            <a:ext cx="6684902" cy="3430654"/>
+            <a:off x="1187451" y="2368550"/>
+            <a:ext cx="6702933" cy="3439541"/>
           </a:xfrm>
           <a:prstGeom prst="rect">
             <a:avLst/>
@@ -5038,34 +4992,9 @@
           <a:chExt cx="0" cy="0"/>
         </a:xfrm>
       </p:grpSpPr>
-      <p:sp>
-        <p:nvSpPr>
-          <p:cNvPr id="2" name="Title 1"/>
-          <p:cNvSpPr>
-            <a:spLocks noGrp="1"/>
-          </p:cNvSpPr>
-          <p:nvPr>
-            <p:ph type="title"/>
-          </p:nvPr>
-        </p:nvSpPr>
-        <p:spPr/>
-        <p:txBody>
-          <a:bodyPr>
-            <a:normAutofit/>
-          </a:bodyPr>
-          <a:lstStyle/>
-          <a:p>
-            <a:r>
-              <a:rPr lang="en-US" dirty="0" smtClean="0"/>
-              <a:t>Project Planning (task view)</a:t>
-            </a:r>
-            <a:endParaRPr lang="en-US" dirty="0"/>
-          </a:p>
-        </p:txBody>
-      </p:sp>
       <p:pic>
         <p:nvPicPr>
-          <p:cNvPr id="5" name="Picture 4" descr="detailed_Gantt.png"/>
+          <p:cNvPr id="18" name="Picture 17" descr="image (5).png"/>
           <p:cNvPicPr>
             <a:picLocks noChangeAspect="1"/>
           </p:cNvPicPr>
@@ -5079,14 +5008,429 @@
         </p:blipFill>
         <p:spPr>
           <a:xfrm>
-            <a:off x="-1" y="1984153"/>
-            <a:ext cx="9144001" cy="3114675"/>
+            <a:off x="106739" y="2049946"/>
+            <a:ext cx="8907780" cy="3299460"/>
           </a:xfrm>
           <a:prstGeom prst="rect">
             <a:avLst/>
           </a:prstGeom>
         </p:spPr>
       </p:pic>
+      <p:sp>
+        <p:nvSpPr>
+          <p:cNvPr id="2" name="Title 1"/>
+          <p:cNvSpPr>
+            <a:spLocks noGrp="1"/>
+          </p:cNvSpPr>
+          <p:nvPr>
+            <p:ph type="title"/>
+          </p:nvPr>
+        </p:nvSpPr>
+        <p:spPr/>
+        <p:txBody>
+          <a:bodyPr>
+            <a:normAutofit/>
+          </a:bodyPr>
+          <a:lstStyle/>
+          <a:p>
+            <a:r>
+              <a:rPr lang="en-US" dirty="0" smtClean="0"/>
+              <a:t>Project Planning (task view)</a:t>
+            </a:r>
+            <a:endParaRPr lang="en-US" dirty="0"/>
+          </a:p>
+        </p:txBody>
+      </p:sp>
+      <p:sp>
+        <p:nvSpPr>
+          <p:cNvPr id="6" name="TextBox 5"/>
+          <p:cNvSpPr txBox="1"/>
+          <p:nvPr/>
+        </p:nvSpPr>
+        <p:spPr>
+          <a:xfrm>
+            <a:off x="4717016" y="2673498"/>
+            <a:ext cx="474183" cy="276999"/>
+          </a:xfrm>
+          <a:prstGeom prst="rect">
+            <a:avLst/>
+          </a:prstGeom>
+          <a:noFill/>
+        </p:spPr>
+        <p:txBody>
+          <a:bodyPr wrap="none" rtlCol="0">
+            <a:spAutoFit/>
+          </a:bodyPr>
+          <a:lstStyle/>
+          <a:p>
+            <a:r>
+              <a:rPr lang="en-US" sz="1200" dirty="0" smtClean="0"/>
+              <a:t>D1.1</a:t>
+            </a:r>
+            <a:endParaRPr lang="en-US" sz="1200" dirty="0"/>
+          </a:p>
+        </p:txBody>
+      </p:sp>
+      <p:sp>
+        <p:nvSpPr>
+          <p:cNvPr id="7" name="TextBox 6"/>
+          <p:cNvSpPr txBox="1"/>
+          <p:nvPr/>
+        </p:nvSpPr>
+        <p:spPr>
+          <a:xfrm>
+            <a:off x="5276949" y="2973945"/>
+            <a:ext cx="474183" cy="276999"/>
+          </a:xfrm>
+          <a:prstGeom prst="rect">
+            <a:avLst/>
+          </a:prstGeom>
+          <a:noFill/>
+        </p:spPr>
+        <p:txBody>
+          <a:bodyPr wrap="none" rtlCol="0">
+            <a:spAutoFit/>
+          </a:bodyPr>
+          <a:lstStyle/>
+          <a:p>
+            <a:r>
+              <a:rPr lang="en-US" sz="1200" dirty="0" smtClean="0"/>
+              <a:t>D1.3</a:t>
+            </a:r>
+            <a:endParaRPr lang="en-US" sz="1200" dirty="0"/>
+          </a:p>
+        </p:txBody>
+      </p:sp>
+      <p:sp>
+        <p:nvSpPr>
+          <p:cNvPr id="8" name="TextBox 7"/>
+          <p:cNvSpPr txBox="1"/>
+          <p:nvPr/>
+        </p:nvSpPr>
+        <p:spPr>
+          <a:xfrm>
+            <a:off x="5846622" y="2835446"/>
+            <a:ext cx="474183" cy="276999"/>
+          </a:xfrm>
+          <a:prstGeom prst="rect">
+            <a:avLst/>
+          </a:prstGeom>
+          <a:noFill/>
+        </p:spPr>
+        <p:txBody>
+          <a:bodyPr wrap="none" rtlCol="0">
+            <a:spAutoFit/>
+          </a:bodyPr>
+          <a:lstStyle/>
+          <a:p>
+            <a:r>
+              <a:rPr lang="en-US" sz="1200" dirty="0" smtClean="0"/>
+              <a:t>D1.2</a:t>
+            </a:r>
+            <a:endParaRPr lang="en-US" sz="1200" dirty="0"/>
+          </a:p>
+        </p:txBody>
+      </p:sp>
+      <p:sp>
+        <p:nvSpPr>
+          <p:cNvPr id="9" name="TextBox 8"/>
+          <p:cNvSpPr txBox="1"/>
+          <p:nvPr/>
+        </p:nvSpPr>
+        <p:spPr>
+          <a:xfrm>
+            <a:off x="6215766" y="3136368"/>
+            <a:ext cx="474183" cy="276999"/>
+          </a:xfrm>
+          <a:prstGeom prst="rect">
+            <a:avLst/>
+          </a:prstGeom>
+          <a:noFill/>
+        </p:spPr>
+        <p:txBody>
+          <a:bodyPr wrap="none" rtlCol="0">
+            <a:spAutoFit/>
+          </a:bodyPr>
+          <a:lstStyle/>
+          <a:p>
+            <a:r>
+              <a:rPr lang="en-US" sz="1200" dirty="0" smtClean="0"/>
+              <a:t>D1.4</a:t>
+            </a:r>
+            <a:endParaRPr lang="en-US" sz="1200" dirty="0"/>
+          </a:p>
+        </p:txBody>
+      </p:sp>
+      <p:sp>
+        <p:nvSpPr>
+          <p:cNvPr id="10" name="TextBox 9"/>
+          <p:cNvSpPr txBox="1"/>
+          <p:nvPr/>
+        </p:nvSpPr>
+        <p:spPr>
+          <a:xfrm>
+            <a:off x="5844988" y="3293963"/>
+            <a:ext cx="474183" cy="276999"/>
+          </a:xfrm>
+          <a:prstGeom prst="rect">
+            <a:avLst/>
+          </a:prstGeom>
+          <a:noFill/>
+        </p:spPr>
+        <p:txBody>
+          <a:bodyPr wrap="none" rtlCol="0">
+            <a:spAutoFit/>
+          </a:bodyPr>
+          <a:lstStyle/>
+          <a:p>
+            <a:r>
+              <a:rPr lang="en-US" sz="1200" dirty="0" smtClean="0"/>
+              <a:t>D2.1</a:t>
+            </a:r>
+            <a:endParaRPr lang="en-US" sz="1200" dirty="0"/>
+          </a:p>
+        </p:txBody>
+      </p:sp>
+      <p:sp>
+        <p:nvSpPr>
+          <p:cNvPr id="11" name="TextBox 10"/>
+          <p:cNvSpPr txBox="1"/>
+          <p:nvPr/>
+        </p:nvSpPr>
+        <p:spPr>
+          <a:xfrm>
+            <a:off x="6215766" y="3442010"/>
+            <a:ext cx="474183" cy="276999"/>
+          </a:xfrm>
+          <a:prstGeom prst="rect">
+            <a:avLst/>
+          </a:prstGeom>
+          <a:noFill/>
+        </p:spPr>
+        <p:txBody>
+          <a:bodyPr wrap="none" rtlCol="0">
+            <a:spAutoFit/>
+          </a:bodyPr>
+          <a:lstStyle/>
+          <a:p>
+            <a:r>
+              <a:rPr lang="en-US" sz="1200" dirty="0" smtClean="0"/>
+              <a:t>D2.2</a:t>
+            </a:r>
+            <a:endParaRPr lang="en-US" sz="1200" dirty="0"/>
+          </a:p>
+        </p:txBody>
+      </p:sp>
+      <p:sp>
+        <p:nvSpPr>
+          <p:cNvPr id="12" name="TextBox 11"/>
+          <p:cNvSpPr txBox="1"/>
+          <p:nvPr/>
+        </p:nvSpPr>
+        <p:spPr>
+          <a:xfrm>
+            <a:off x="6975376" y="3599605"/>
+            <a:ext cx="474183" cy="276999"/>
+          </a:xfrm>
+          <a:prstGeom prst="rect">
+            <a:avLst/>
+          </a:prstGeom>
+          <a:noFill/>
+        </p:spPr>
+        <p:txBody>
+          <a:bodyPr wrap="none" rtlCol="0">
+            <a:spAutoFit/>
+          </a:bodyPr>
+          <a:lstStyle/>
+          <a:p>
+            <a:r>
+              <a:rPr lang="en-US" sz="1200" dirty="0" smtClean="0"/>
+              <a:t>D3.1</a:t>
+            </a:r>
+            <a:endParaRPr lang="en-US" sz="1200" dirty="0"/>
+          </a:p>
+        </p:txBody>
+      </p:sp>
+      <p:sp>
+        <p:nvSpPr>
+          <p:cNvPr id="13" name="TextBox 12"/>
+          <p:cNvSpPr txBox="1"/>
+          <p:nvPr/>
+        </p:nvSpPr>
+        <p:spPr>
+          <a:xfrm>
+            <a:off x="7163089" y="3757200"/>
+            <a:ext cx="474183" cy="276999"/>
+          </a:xfrm>
+          <a:prstGeom prst="rect">
+            <a:avLst/>
+          </a:prstGeom>
+          <a:noFill/>
+        </p:spPr>
+        <p:txBody>
+          <a:bodyPr wrap="none" rtlCol="0">
+            <a:spAutoFit/>
+          </a:bodyPr>
+          <a:lstStyle/>
+          <a:p>
+            <a:r>
+              <a:rPr lang="en-US" sz="1200" dirty="0" smtClean="0"/>
+              <a:t>D3.2</a:t>
+            </a:r>
+            <a:endParaRPr lang="en-US" sz="1200" dirty="0"/>
+          </a:p>
+        </p:txBody>
+      </p:sp>
+      <p:sp>
+        <p:nvSpPr>
+          <p:cNvPr id="14" name="TextBox 13"/>
+          <p:cNvSpPr txBox="1"/>
+          <p:nvPr/>
+        </p:nvSpPr>
+        <p:spPr>
+          <a:xfrm>
+            <a:off x="7532233" y="3914795"/>
+            <a:ext cx="474183" cy="276999"/>
+          </a:xfrm>
+          <a:prstGeom prst="rect">
+            <a:avLst/>
+          </a:prstGeom>
+          <a:noFill/>
+        </p:spPr>
+        <p:txBody>
+          <a:bodyPr wrap="none" rtlCol="0">
+            <a:spAutoFit/>
+          </a:bodyPr>
+          <a:lstStyle/>
+          <a:p>
+            <a:r>
+              <a:rPr lang="en-US" sz="1200" dirty="0" smtClean="0"/>
+              <a:t>D3.3</a:t>
+            </a:r>
+            <a:endParaRPr lang="en-US" sz="1200" dirty="0"/>
+          </a:p>
+        </p:txBody>
+      </p:sp>
+      <p:sp>
+        <p:nvSpPr>
+          <p:cNvPr id="15" name="TextBox 14"/>
+          <p:cNvSpPr txBox="1"/>
+          <p:nvPr/>
+        </p:nvSpPr>
+        <p:spPr>
+          <a:xfrm>
+            <a:off x="7532233" y="4067195"/>
+            <a:ext cx="474183" cy="276999"/>
+          </a:xfrm>
+          <a:prstGeom prst="rect">
+            <a:avLst/>
+          </a:prstGeom>
+          <a:noFill/>
+        </p:spPr>
+        <p:txBody>
+          <a:bodyPr wrap="none" rtlCol="0">
+            <a:spAutoFit/>
+          </a:bodyPr>
+          <a:lstStyle/>
+          <a:p>
+            <a:r>
+              <a:rPr lang="en-US" sz="1200" dirty="0" smtClean="0"/>
+              <a:t>D4.1</a:t>
+            </a:r>
+            <a:endParaRPr lang="en-US" sz="1200" dirty="0"/>
+          </a:p>
+        </p:txBody>
+      </p:sp>
+      <p:sp>
+        <p:nvSpPr>
+          <p:cNvPr id="16" name="TextBox 15"/>
+          <p:cNvSpPr txBox="1"/>
+          <p:nvPr/>
+        </p:nvSpPr>
+        <p:spPr>
+          <a:xfrm>
+            <a:off x="7531849" y="4219595"/>
+            <a:ext cx="474183" cy="276999"/>
+          </a:xfrm>
+          <a:prstGeom prst="rect">
+            <a:avLst/>
+          </a:prstGeom>
+          <a:noFill/>
+        </p:spPr>
+        <p:txBody>
+          <a:bodyPr wrap="none" rtlCol="0">
+            <a:spAutoFit/>
+          </a:bodyPr>
+          <a:lstStyle/>
+          <a:p>
+            <a:r>
+              <a:rPr lang="en-US" sz="1200" dirty="0" smtClean="0"/>
+              <a:t>D4.2</a:t>
+            </a:r>
+            <a:endParaRPr lang="en-US" sz="1200" dirty="0"/>
+          </a:p>
+        </p:txBody>
+      </p:sp>
+      <p:sp>
+        <p:nvSpPr>
+          <p:cNvPr id="17" name="TextBox 16"/>
+          <p:cNvSpPr txBox="1"/>
+          <p:nvPr/>
+        </p:nvSpPr>
+        <p:spPr>
+          <a:xfrm>
+            <a:off x="5835439" y="4634618"/>
+            <a:ext cx="474183" cy="276999"/>
+          </a:xfrm>
+          <a:prstGeom prst="rect">
+            <a:avLst/>
+          </a:prstGeom>
+          <a:noFill/>
+        </p:spPr>
+        <p:txBody>
+          <a:bodyPr wrap="none" rtlCol="0">
+            <a:spAutoFit/>
+          </a:bodyPr>
+          <a:lstStyle/>
+          <a:p>
+            <a:r>
+              <a:rPr lang="en-US" sz="1200" dirty="0" smtClean="0"/>
+              <a:t>D5.2</a:t>
+            </a:r>
+            <a:endParaRPr lang="en-US" sz="1200" dirty="0"/>
+          </a:p>
+        </p:txBody>
+      </p:sp>
+      <p:sp>
+        <p:nvSpPr>
+          <p:cNvPr id="19" name="TextBox 18"/>
+          <p:cNvSpPr txBox="1"/>
+          <p:nvPr/>
+        </p:nvSpPr>
+        <p:spPr>
+          <a:xfrm>
+            <a:off x="4333490" y="4636293"/>
+            <a:ext cx="474183" cy="276999"/>
+          </a:xfrm>
+          <a:prstGeom prst="rect">
+            <a:avLst/>
+          </a:prstGeom>
+          <a:noFill/>
+        </p:spPr>
+        <p:txBody>
+          <a:bodyPr wrap="none" rtlCol="0">
+            <a:spAutoFit/>
+          </a:bodyPr>
+          <a:lstStyle/>
+          <a:p>
+            <a:r>
+              <a:rPr lang="en-US" sz="1200" dirty="0" smtClean="0"/>
+              <a:t>D5.1</a:t>
+            </a:r>
+            <a:endParaRPr lang="en-US" sz="1200" dirty="0"/>
+          </a:p>
+        </p:txBody>
+      </p:sp>
     </p:spTree>
   </p:cSld>
   <p:clrMapOvr>

</xml_diff>